<commit_message>
changes to git.ppt and attendence.xlsx, added 2 sheets mumbai and gurugram
</commit_message>
<xml_diff>
--- a/Day 1/Git.pptx
+++ b/Day 1/Git.pptx
@@ -4258,7 +4258,7 @@
             </a:pPr>
             <a:r>
               <a:rPr lang="en-IN" sz="2400" b="1" dirty="0"/>
-              <a:t>git clone, </a:t>
+              <a:t>git clone</a:t>
             </a:r>
           </a:p>
           <a:p>
@@ -4268,7 +4268,7 @@
             </a:pPr>
             <a:r>
               <a:rPr lang="en-IN" sz="2400" b="1" dirty="0"/>
-              <a:t>git status, </a:t>
+              <a:t>git status </a:t>
             </a:r>
           </a:p>
           <a:p>
@@ -4278,7 +4278,7 @@
             </a:pPr>
             <a:r>
               <a:rPr lang="en-IN" sz="2400" b="1" dirty="0"/>
-              <a:t>git add,</a:t>
+              <a:t>git add</a:t>
             </a:r>
           </a:p>
           <a:p>
@@ -4288,7 +4288,7 @@
             </a:pPr>
             <a:r>
               <a:rPr lang="en-IN" sz="2400" b="1" dirty="0"/>
-              <a:t> git commit, </a:t>
+              <a:t> git commit </a:t>
             </a:r>
           </a:p>
           <a:p>
@@ -4297,9 +4297,10 @@
               <a:buChar char="•"/>
             </a:pPr>
             <a:r>
-              <a:rPr lang="en-IN" sz="2400" b="1" dirty="0"/>
-              <a:t>git push, </a:t>
-            </a:r>
+              <a:rPr lang="en-IN" sz="2400" b="1"/>
+              <a:t>git push</a:t>
+            </a:r>
+            <a:endParaRPr lang="en-IN" sz="2400" b="1" dirty="0"/>
           </a:p>
           <a:p>
             <a:pPr marL="2171700" lvl="4" indent="-342900" algn="l">

</xml_diff>